<commit_message>
Add a document and fix dockerfile
Add CI pipeline diagram
Modify sprint 2 file
Modify dockerfile
</commit_message>
<xml_diff>
--- a/Documents/Presentations/Sprint 2.pptx
+++ b/Documents/Presentations/Sprint 2.pptx
@@ -11,8 +11,9 @@
     <p:sldId id="260" r:id="rId5"/>
     <p:sldId id="267" r:id="rId6"/>
     <p:sldId id="268" r:id="rId7"/>
-    <p:sldId id="266" r:id="rId8"/>
-    <p:sldId id="265" r:id="rId9"/>
+    <p:sldId id="270" r:id="rId8"/>
+    <p:sldId id="266" r:id="rId9"/>
+    <p:sldId id="265" r:id="rId10"/>
   </p:sldIdLst>
   <p:sldSz cx="12192000" cy="6858000"/>
   <p:notesSz cx="6858000" cy="9144000"/>
@@ -2812,7 +2813,7 @@
           <a:p>
             <a:fld id="{941FF5B8-ADB4-407F-8320-DC3E7A021C76}" type="datetimeFigureOut">
               <a:rPr lang="en-US" smtClean="0"/>
-              <a:t>4/13/2024</a:t>
+              <a:t>4/18/2024</a:t>
             </a:fld>
             <a:endParaRPr lang="en-US"/>
           </a:p>
@@ -3010,7 +3011,7 @@
           <a:p>
             <a:fld id="{941FF5B8-ADB4-407F-8320-DC3E7A021C76}" type="datetimeFigureOut">
               <a:rPr lang="en-US" smtClean="0"/>
-              <a:t>4/13/2024</a:t>
+              <a:t>4/18/2024</a:t>
             </a:fld>
             <a:endParaRPr lang="en-US"/>
           </a:p>
@@ -3218,7 +3219,7 @@
           <a:p>
             <a:fld id="{941FF5B8-ADB4-407F-8320-DC3E7A021C76}" type="datetimeFigureOut">
               <a:rPr lang="en-US" smtClean="0"/>
-              <a:t>4/13/2024</a:t>
+              <a:t>4/18/2024</a:t>
             </a:fld>
             <a:endParaRPr lang="en-US"/>
           </a:p>
@@ -3416,7 +3417,7 @@
           <a:p>
             <a:fld id="{941FF5B8-ADB4-407F-8320-DC3E7A021C76}" type="datetimeFigureOut">
               <a:rPr lang="en-US" smtClean="0"/>
-              <a:t>4/13/2024</a:t>
+              <a:t>4/18/2024</a:t>
             </a:fld>
             <a:endParaRPr lang="en-US"/>
           </a:p>
@@ -3691,7 +3692,7 @@
           <a:p>
             <a:fld id="{941FF5B8-ADB4-407F-8320-DC3E7A021C76}" type="datetimeFigureOut">
               <a:rPr lang="en-US" smtClean="0"/>
-              <a:t>4/13/2024</a:t>
+              <a:t>4/18/2024</a:t>
             </a:fld>
             <a:endParaRPr lang="en-US"/>
           </a:p>
@@ -3956,7 +3957,7 @@
           <a:p>
             <a:fld id="{941FF5B8-ADB4-407F-8320-DC3E7A021C76}" type="datetimeFigureOut">
               <a:rPr lang="en-US" smtClean="0"/>
-              <a:t>4/13/2024</a:t>
+              <a:t>4/18/2024</a:t>
             </a:fld>
             <a:endParaRPr lang="en-US"/>
           </a:p>
@@ -4368,7 +4369,7 @@
           <a:p>
             <a:fld id="{941FF5B8-ADB4-407F-8320-DC3E7A021C76}" type="datetimeFigureOut">
               <a:rPr lang="en-US" smtClean="0"/>
-              <a:t>4/13/2024</a:t>
+              <a:t>4/18/2024</a:t>
             </a:fld>
             <a:endParaRPr lang="en-US"/>
           </a:p>
@@ -4509,7 +4510,7 @@
           <a:p>
             <a:fld id="{941FF5B8-ADB4-407F-8320-DC3E7A021C76}" type="datetimeFigureOut">
               <a:rPr lang="en-US" smtClean="0"/>
-              <a:t>4/13/2024</a:t>
+              <a:t>4/18/2024</a:t>
             </a:fld>
             <a:endParaRPr lang="en-US"/>
           </a:p>
@@ -4622,7 +4623,7 @@
           <a:p>
             <a:fld id="{941FF5B8-ADB4-407F-8320-DC3E7A021C76}" type="datetimeFigureOut">
               <a:rPr lang="en-US" smtClean="0"/>
-              <a:t>4/13/2024</a:t>
+              <a:t>4/18/2024</a:t>
             </a:fld>
             <a:endParaRPr lang="en-US"/>
           </a:p>
@@ -4933,7 +4934,7 @@
           <a:p>
             <a:fld id="{941FF5B8-ADB4-407F-8320-DC3E7A021C76}" type="datetimeFigureOut">
               <a:rPr lang="en-US" smtClean="0"/>
-              <a:t>4/13/2024</a:t>
+              <a:t>4/18/2024</a:t>
             </a:fld>
             <a:endParaRPr lang="en-US"/>
           </a:p>
@@ -5221,7 +5222,7 @@
           <a:p>
             <a:fld id="{941FF5B8-ADB4-407F-8320-DC3E7A021C76}" type="datetimeFigureOut">
               <a:rPr lang="en-US" smtClean="0"/>
-              <a:t>4/13/2024</a:t>
+              <a:t>4/18/2024</a:t>
             </a:fld>
             <a:endParaRPr lang="en-US"/>
           </a:p>
@@ -5462,7 +5463,7 @@
           <a:p>
             <a:fld id="{941FF5B8-ADB4-407F-8320-DC3E7A021C76}" type="datetimeFigureOut">
               <a:rPr lang="en-US" smtClean="0"/>
-              <a:t>4/13/2024</a:t>
+              <a:t>4/18/2024</a:t>
             </a:fld>
             <a:endParaRPr lang="en-US"/>
           </a:p>
@@ -7791,6 +7792,12 @@
             </a:r>
           </a:p>
           <a:p>
+            <a:r>
+              <a:rPr lang="en-US" sz="2000" dirty="0"/>
+              <a:t>Setup CI pipeline</a:t>
+            </a:r>
+          </a:p>
+          <a:p>
             <a:endParaRPr lang="en-US" sz="2000" dirty="0"/>
           </a:p>
         </p:txBody>
@@ -9395,6 +9402,532 @@
       </p:grpSpPr>
       <p:sp useBgFill="1">
         <p:nvSpPr>
+          <p:cNvPr id="8" name="Rectangle 7">
+            <a:extLst>
+              <a:ext uri="{FF2B5EF4-FFF2-40B4-BE49-F238E27FC236}">
+                <a16:creationId xmlns:a16="http://schemas.microsoft.com/office/drawing/2014/main" id="{1B15ED52-F352-441B-82BF-E0EA34836D08}"/>
+              </a:ext>
+              <a:ext uri="{C183D7F6-B498-43B3-948B-1728B52AA6E4}">
+                <adec:decorative xmlns:adec="http://schemas.microsoft.com/office/drawing/2017/decorative" val="1"/>
+              </a:ext>
+            </a:extLst>
+          </p:cNvPr>
+          <p:cNvSpPr>
+            <a:spLocks noGrp="1" noRot="1" noChangeAspect="1" noMove="1" noResize="1" noEditPoints="1" noAdjustHandles="1" noChangeArrowheads="1" noChangeShapeType="1" noTextEdit="1"/>
+          </p:cNvSpPr>
+          <p:nvPr>
+            <p:extLst>
+              <p:ext uri="{386F3935-93C4-4BCD-93E2-E3B085C9AB24}">
+                <p16:designElem xmlns:p16="http://schemas.microsoft.com/office/powerpoint/2015/main" val="1"/>
+              </p:ext>
+            </p:extLst>
+          </p:nvPr>
+        </p:nvSpPr>
+        <p:spPr>
+          <a:xfrm>
+            <a:off x="0" y="0"/>
+            <a:ext cx="12192000" cy="6858000"/>
+          </a:xfrm>
+          <a:prstGeom prst="rect">
+            <a:avLst/>
+          </a:prstGeom>
+          <a:ln w="12700" cap="flat" cmpd="sng" algn="ctr">
+            <a:noFill/>
+            <a:prstDash val="solid"/>
+            <a:miter lim="800000"/>
+          </a:ln>
+          <a:effectLst/>
+          <a:extLst>
+            <a:ext uri="{91240B29-F687-4F45-9708-019B960494DF}">
+              <a14:hiddenLine xmlns:a14="http://schemas.microsoft.com/office/drawing/2010/main" w="12700" cap="flat" cmpd="sng" algn="ctr">
+                <a:solidFill>
+                  <a:schemeClr val="accent1">
+                    <a:shade val="50000"/>
+                  </a:schemeClr>
+                </a:solidFill>
+                <a:prstDash val="solid"/>
+                <a:miter lim="800000"/>
+              </a14:hiddenLine>
+            </a:ext>
+          </a:extLst>
+        </p:spPr>
+        <p:style>
+          <a:lnRef idx="2">
+            <a:schemeClr val="accent1">
+              <a:shade val="50000"/>
+            </a:schemeClr>
+          </a:lnRef>
+          <a:fillRef idx="1">
+            <a:schemeClr val="accent1"/>
+          </a:fillRef>
+          <a:effectRef idx="0">
+            <a:schemeClr val="accent1"/>
+          </a:effectRef>
+          <a:fontRef idx="minor">
+            <a:schemeClr val="lt1"/>
+          </a:fontRef>
+        </p:style>
+        <p:txBody>
+          <a:bodyPr rtlCol="0" anchor="ctr"/>
+          <a:lstStyle/>
+          <a:p>
+            <a:pPr algn="ctr"/>
+            <a:endParaRPr lang="en-US"/>
+          </a:p>
+        </p:txBody>
+      </p:sp>
+      <p:sp>
+        <p:nvSpPr>
+          <p:cNvPr id="10" name="Rectangle 9">
+            <a:extLst>
+              <a:ext uri="{FF2B5EF4-FFF2-40B4-BE49-F238E27FC236}">
+                <a16:creationId xmlns:a16="http://schemas.microsoft.com/office/drawing/2014/main" id="{3B2E3793-BFE6-45A2-9B7B-E18844431C99}"/>
+              </a:ext>
+              <a:ext uri="{C183D7F6-B498-43B3-948B-1728B52AA6E4}">
+                <adec:decorative xmlns:adec="http://schemas.microsoft.com/office/drawing/2017/decorative" val="1"/>
+              </a:ext>
+            </a:extLst>
+          </p:cNvPr>
+          <p:cNvSpPr>
+            <a:spLocks noGrp="1" noRot="1" noChangeAspect="1" noMove="1" noResize="1" noEditPoints="1" noAdjustHandles="1" noChangeArrowheads="1" noChangeShapeType="1" noTextEdit="1"/>
+          </p:cNvSpPr>
+          <p:nvPr>
+            <p:extLst>
+              <p:ext uri="{386F3935-93C4-4BCD-93E2-E3B085C9AB24}">
+                <p16:designElem xmlns:p16="http://schemas.microsoft.com/office/powerpoint/2015/main" val="1"/>
+              </p:ext>
+            </p:extLst>
+          </p:nvPr>
+        </p:nvSpPr>
+        <p:spPr>
+          <a:xfrm flipH="1">
+            <a:off x="-1" y="-1"/>
+            <a:ext cx="12191998" cy="1590742"/>
+          </a:xfrm>
+          <a:prstGeom prst="rect">
+            <a:avLst/>
+          </a:prstGeom>
+          <a:gradFill>
+            <a:gsLst>
+              <a:gs pos="0">
+                <a:srgbClr val="000000"/>
+              </a:gs>
+              <a:gs pos="100000">
+                <a:schemeClr val="accent1">
+                  <a:lumMod val="75000"/>
+                </a:schemeClr>
+              </a:gs>
+            </a:gsLst>
+            <a:lin ang="8400000" scaled="0"/>
+          </a:gradFill>
+          <a:ln>
+            <a:noFill/>
+          </a:ln>
+        </p:spPr>
+        <p:style>
+          <a:lnRef idx="2">
+            <a:schemeClr val="accent1">
+              <a:shade val="50000"/>
+            </a:schemeClr>
+          </a:lnRef>
+          <a:fillRef idx="1">
+            <a:schemeClr val="accent1"/>
+          </a:fillRef>
+          <a:effectRef idx="0">
+            <a:schemeClr val="accent1"/>
+          </a:effectRef>
+          <a:fontRef idx="minor">
+            <a:schemeClr val="lt1"/>
+          </a:fontRef>
+        </p:style>
+        <p:txBody>
+          <a:bodyPr rtlCol="0" anchor="ctr"/>
+          <a:lstStyle/>
+          <a:p>
+            <a:pPr algn="ctr"/>
+            <a:endParaRPr lang="en-US"/>
+          </a:p>
+        </p:txBody>
+      </p:sp>
+      <p:sp>
+        <p:nvSpPr>
+          <p:cNvPr id="12" name="Rectangle 11">
+            <a:extLst>
+              <a:ext uri="{FF2B5EF4-FFF2-40B4-BE49-F238E27FC236}">
+                <a16:creationId xmlns:a16="http://schemas.microsoft.com/office/drawing/2014/main" id="{BC4C4868-CB8F-4AF9-9CDB-8108F2C19B67}"/>
+              </a:ext>
+              <a:ext uri="{C183D7F6-B498-43B3-948B-1728B52AA6E4}">
+                <adec:decorative xmlns:adec="http://schemas.microsoft.com/office/drawing/2017/decorative" val="1"/>
+              </a:ext>
+            </a:extLst>
+          </p:cNvPr>
+          <p:cNvSpPr>
+            <a:spLocks noGrp="1" noRot="1" noChangeAspect="1" noMove="1" noResize="1" noEditPoints="1" noAdjustHandles="1" noChangeArrowheads="1" noChangeShapeType="1" noTextEdit="1"/>
+          </p:cNvSpPr>
+          <p:nvPr>
+            <p:extLst>
+              <p:ext uri="{386F3935-93C4-4BCD-93E2-E3B085C9AB24}">
+                <p16:designElem xmlns:p16="http://schemas.microsoft.com/office/powerpoint/2015/main" val="1"/>
+              </p:ext>
+            </p:extLst>
+          </p:nvPr>
+        </p:nvSpPr>
+        <p:spPr>
+          <a:xfrm rot="10800000" flipH="1">
+            <a:off x="-3" y="0"/>
+            <a:ext cx="8115306" cy="1590742"/>
+          </a:xfrm>
+          <a:prstGeom prst="rect">
+            <a:avLst/>
+          </a:prstGeom>
+          <a:gradFill>
+            <a:gsLst>
+              <a:gs pos="20000">
+                <a:schemeClr val="accent1">
+                  <a:alpha val="0"/>
+                </a:schemeClr>
+              </a:gs>
+              <a:gs pos="100000">
+                <a:schemeClr val="accent1">
+                  <a:lumMod val="50000"/>
+                  <a:alpha val="55000"/>
+                </a:schemeClr>
+              </a:gs>
+            </a:gsLst>
+            <a:lin ang="13800000" scaled="0"/>
+          </a:gradFill>
+          <a:ln>
+            <a:noFill/>
+          </a:ln>
+        </p:spPr>
+        <p:style>
+          <a:lnRef idx="2">
+            <a:schemeClr val="accent1">
+              <a:shade val="50000"/>
+            </a:schemeClr>
+          </a:lnRef>
+          <a:fillRef idx="1">
+            <a:schemeClr val="accent1"/>
+          </a:fillRef>
+          <a:effectRef idx="0">
+            <a:schemeClr val="accent1"/>
+          </a:effectRef>
+          <a:fontRef idx="minor">
+            <a:schemeClr val="lt1"/>
+          </a:fontRef>
+        </p:style>
+        <p:txBody>
+          <a:bodyPr rtlCol="0" anchor="ctr"/>
+          <a:lstStyle/>
+          <a:p>
+            <a:pPr algn="ctr"/>
+            <a:endParaRPr lang="en-US"/>
+          </a:p>
+        </p:txBody>
+      </p:sp>
+      <p:sp>
+        <p:nvSpPr>
+          <p:cNvPr id="18" name="Rectangle 17">
+            <a:extLst>
+              <a:ext uri="{FF2B5EF4-FFF2-40B4-BE49-F238E27FC236}">
+                <a16:creationId xmlns:a16="http://schemas.microsoft.com/office/drawing/2014/main" id="{375E0459-6403-40CD-989D-56A4407CA12E}"/>
+              </a:ext>
+              <a:ext uri="{C183D7F6-B498-43B3-948B-1728B52AA6E4}">
+                <adec:decorative xmlns:adec="http://schemas.microsoft.com/office/drawing/2017/decorative" val="1"/>
+              </a:ext>
+            </a:extLst>
+          </p:cNvPr>
+          <p:cNvSpPr>
+            <a:spLocks noGrp="1" noRot="1" noChangeAspect="1" noMove="1" noResize="1" noEditPoints="1" noAdjustHandles="1" noChangeArrowheads="1" noChangeShapeType="1" noTextEdit="1"/>
+          </p:cNvSpPr>
+          <p:nvPr>
+            <p:extLst>
+              <p:ext uri="{386F3935-93C4-4BCD-93E2-E3B085C9AB24}">
+                <p16:designElem xmlns:p16="http://schemas.microsoft.com/office/powerpoint/2015/main" val="1"/>
+              </p:ext>
+            </p:extLst>
+          </p:nvPr>
+        </p:nvSpPr>
+        <p:spPr>
+          <a:xfrm flipH="1">
+            <a:off x="8115299" y="-1"/>
+            <a:ext cx="4076698" cy="1590742"/>
+          </a:xfrm>
+          <a:prstGeom prst="rect">
+            <a:avLst/>
+          </a:prstGeom>
+          <a:gradFill>
+            <a:gsLst>
+              <a:gs pos="0">
+                <a:schemeClr val="accent1">
+                  <a:alpha val="66000"/>
+                </a:schemeClr>
+              </a:gs>
+              <a:gs pos="100000">
+                <a:srgbClr val="000000">
+                  <a:alpha val="30000"/>
+                </a:srgbClr>
+              </a:gs>
+            </a:gsLst>
+            <a:lin ang="13200000" scaled="0"/>
+          </a:gradFill>
+          <a:ln>
+            <a:noFill/>
+          </a:ln>
+        </p:spPr>
+        <p:style>
+          <a:lnRef idx="2">
+            <a:schemeClr val="accent1">
+              <a:shade val="50000"/>
+            </a:schemeClr>
+          </a:lnRef>
+          <a:fillRef idx="1">
+            <a:schemeClr val="accent1"/>
+          </a:fillRef>
+          <a:effectRef idx="0">
+            <a:schemeClr val="accent1"/>
+          </a:effectRef>
+          <a:fontRef idx="minor">
+            <a:schemeClr val="lt1"/>
+          </a:fontRef>
+        </p:style>
+        <p:txBody>
+          <a:bodyPr rtlCol="0" anchor="ctr"/>
+          <a:lstStyle/>
+          <a:p>
+            <a:pPr algn="ctr"/>
+            <a:endParaRPr lang="en-US"/>
+          </a:p>
+        </p:txBody>
+      </p:sp>
+      <p:sp>
+        <p:nvSpPr>
+          <p:cNvPr id="19" name="Rectangle 18">
+            <a:extLst>
+              <a:ext uri="{FF2B5EF4-FFF2-40B4-BE49-F238E27FC236}">
+                <a16:creationId xmlns:a16="http://schemas.microsoft.com/office/drawing/2014/main" id="{53E5B1A8-3AC9-4BD1-9BBC-78CA94F2D1BA}"/>
+              </a:ext>
+              <a:ext uri="{C183D7F6-B498-43B3-948B-1728B52AA6E4}">
+                <adec:decorative xmlns:adec="http://schemas.microsoft.com/office/drawing/2017/decorative" val="1"/>
+              </a:ext>
+            </a:extLst>
+          </p:cNvPr>
+          <p:cNvSpPr>
+            <a:spLocks noGrp="1" noRot="1" noChangeAspect="1" noMove="1" noResize="1" noEditPoints="1" noAdjustHandles="1" noChangeArrowheads="1" noChangeShapeType="1" noTextEdit="1"/>
+          </p:cNvSpPr>
+          <p:nvPr>
+            <p:extLst>
+              <p:ext uri="{386F3935-93C4-4BCD-93E2-E3B085C9AB24}">
+                <p16:designElem xmlns:p16="http://schemas.microsoft.com/office/powerpoint/2015/main" val="1"/>
+              </p:ext>
+            </p:extLst>
+          </p:nvPr>
+        </p:nvSpPr>
+        <p:spPr>
+          <a:xfrm>
+            <a:off x="459350" y="-1"/>
+            <a:ext cx="11732646" cy="1597433"/>
+          </a:xfrm>
+          <a:prstGeom prst="rect">
+            <a:avLst/>
+          </a:prstGeom>
+          <a:gradFill>
+            <a:gsLst>
+              <a:gs pos="50000">
+                <a:srgbClr val="000000">
+                  <a:alpha val="0"/>
+                </a:srgbClr>
+              </a:gs>
+              <a:gs pos="99000">
+                <a:schemeClr val="accent1">
+                  <a:lumMod val="50000"/>
+                  <a:alpha val="52000"/>
+                </a:schemeClr>
+              </a:gs>
+            </a:gsLst>
+            <a:lin ang="16800000" scaled="0"/>
+          </a:gradFill>
+          <a:ln>
+            <a:noFill/>
+          </a:ln>
+        </p:spPr>
+        <p:style>
+          <a:lnRef idx="2">
+            <a:schemeClr val="accent1">
+              <a:shade val="50000"/>
+            </a:schemeClr>
+          </a:lnRef>
+          <a:fillRef idx="1">
+            <a:schemeClr val="accent1"/>
+          </a:fillRef>
+          <a:effectRef idx="0">
+            <a:schemeClr val="accent1"/>
+          </a:effectRef>
+          <a:fontRef idx="minor">
+            <a:schemeClr val="lt1"/>
+          </a:fontRef>
+        </p:style>
+        <p:txBody>
+          <a:bodyPr rtlCol="0" anchor="ctr"/>
+          <a:lstStyle/>
+          <a:p>
+            <a:pPr algn="ctr"/>
+            <a:endParaRPr lang="en-US"/>
+          </a:p>
+        </p:txBody>
+      </p:sp>
+      <p:sp>
+        <p:nvSpPr>
+          <p:cNvPr id="2" name="Title 1">
+            <a:extLst>
+              <a:ext uri="{FF2B5EF4-FFF2-40B4-BE49-F238E27FC236}">
+                <a16:creationId xmlns:a16="http://schemas.microsoft.com/office/drawing/2014/main" id="{4D7E464B-F8F8-5877-8B1F-FCD54819C5A0}"/>
+              </a:ext>
+            </a:extLst>
+          </p:cNvPr>
+          <p:cNvSpPr>
+            <a:spLocks noGrp="1"/>
+          </p:cNvSpPr>
+          <p:nvPr>
+            <p:ph type="title"/>
+          </p:nvPr>
+        </p:nvSpPr>
+        <p:spPr>
+          <a:xfrm>
+            <a:off x="1371599" y="294538"/>
+            <a:ext cx="9895951" cy="1033669"/>
+          </a:xfrm>
+        </p:spPr>
+        <p:txBody>
+          <a:bodyPr>
+            <a:normAutofit/>
+          </a:bodyPr>
+          <a:lstStyle/>
+          <a:p>
+            <a:r>
+              <a:rPr lang="en-US" sz="4000" dirty="0">
+                <a:solidFill>
+                  <a:srgbClr val="FFFFFF"/>
+                </a:solidFill>
+              </a:rPr>
+              <a:t>Setup CI pipeline</a:t>
+            </a:r>
+          </a:p>
+        </p:txBody>
+      </p:sp>
+      <p:sp>
+        <p:nvSpPr>
+          <p:cNvPr id="3" name="Content Placeholder 2">
+            <a:extLst>
+              <a:ext uri="{FF2B5EF4-FFF2-40B4-BE49-F238E27FC236}">
+                <a16:creationId xmlns:a16="http://schemas.microsoft.com/office/drawing/2014/main" id="{10DE9F08-8C27-8937-FA7D-3C698BBBDED8}"/>
+              </a:ext>
+            </a:extLst>
+          </p:cNvPr>
+          <p:cNvSpPr>
+            <a:spLocks noGrp="1"/>
+          </p:cNvSpPr>
+          <p:nvPr>
+            <p:ph idx="1"/>
+          </p:nvPr>
+        </p:nvSpPr>
+        <p:spPr>
+          <a:xfrm>
+            <a:off x="1371599" y="2318197"/>
+            <a:ext cx="9724031" cy="3683358"/>
+          </a:xfrm>
+        </p:spPr>
+        <p:txBody>
+          <a:bodyPr anchor="ctr">
+            <a:normAutofit/>
+          </a:bodyPr>
+          <a:lstStyle/>
+          <a:p>
+            <a:pPr marL="0" indent="0">
+              <a:buNone/>
+            </a:pPr>
+            <a:endParaRPr lang="en-US" sz="2000" dirty="0"/>
+          </a:p>
+          <a:p>
+            <a:endParaRPr lang="en-US" sz="2000" dirty="0"/>
+          </a:p>
+        </p:txBody>
+      </p:sp>
+      <p:pic>
+        <p:nvPicPr>
+          <p:cNvPr id="6" name="Picture 5" descr="A screenshot of a computer&#10;&#10;Description automatically generated">
+            <a:extLst>
+              <a:ext uri="{FF2B5EF4-FFF2-40B4-BE49-F238E27FC236}">
+                <a16:creationId xmlns:a16="http://schemas.microsoft.com/office/drawing/2014/main" id="{65DD5DD7-A0D9-547B-D7AF-E7738E11E073}"/>
+              </a:ext>
+            </a:extLst>
+          </p:cNvPr>
+          <p:cNvPicPr>
+            <a:picLocks noChangeAspect="1"/>
+          </p:cNvPicPr>
+          <p:nvPr/>
+        </p:nvPicPr>
+        <p:blipFill rotWithShape="1">
+          <a:blip r:embed="rId2">
+            <a:extLst>
+              <a:ext uri="{28A0092B-C50C-407E-A947-70E740481C1C}">
+                <a14:useLocalDpi xmlns:a14="http://schemas.microsoft.com/office/drawing/2010/main" val="0"/>
+              </a:ext>
+            </a:extLst>
+          </a:blip>
+          <a:srcRect l="20224" t="425" r="25083" b="45865"/>
+          <a:stretch/>
+        </p:blipFill>
+        <p:spPr>
+          <a:xfrm>
+            <a:off x="2402733" y="1622745"/>
+            <a:ext cx="6731540" cy="5107983"/>
+          </a:xfrm>
+          <a:prstGeom prst="rect">
+            <a:avLst/>
+          </a:prstGeom>
+        </p:spPr>
+      </p:pic>
+    </p:spTree>
+    <p:extLst>
+      <p:ext uri="{BB962C8B-B14F-4D97-AF65-F5344CB8AC3E}">
+        <p14:creationId xmlns:p14="http://schemas.microsoft.com/office/powerpoint/2010/main" val="1746149579"/>
+      </p:ext>
+    </p:extLst>
+  </p:cSld>
+  <p:clrMapOvr>
+    <a:masterClrMapping/>
+  </p:clrMapOvr>
+</p:sld>
+</file>
+
+<file path=ppt/slides/slide8.xml><?xml version="1.0" encoding="utf-8"?>
+<p:sld xmlns:a="http://schemas.openxmlformats.org/drawingml/2006/main" xmlns:r="http://schemas.openxmlformats.org/officeDocument/2006/relationships" xmlns:p="http://schemas.openxmlformats.org/presentationml/2006/main">
+  <p:cSld>
+    <p:bg>
+      <p:bgPr>
+        <a:solidFill>
+          <a:schemeClr val="bg1"/>
+        </a:solidFill>
+        <a:effectLst/>
+      </p:bgPr>
+    </p:bg>
+    <p:spTree>
+      <p:nvGrpSpPr>
+        <p:cNvPr id="1" name=""/>
+        <p:cNvGrpSpPr/>
+        <p:nvPr/>
+      </p:nvGrpSpPr>
+      <p:grpSpPr>
+        <a:xfrm>
+          <a:off x="0" y="0"/>
+          <a:ext cx="0" cy="0"/>
+          <a:chOff x="0" y="0"/>
+          <a:chExt cx="0" cy="0"/>
+        </a:xfrm>
+      </p:grpSpPr>
+      <p:sp useBgFill="1">
+        <p:nvSpPr>
           <p:cNvPr id="19" name="Rectangle 18">
             <a:extLst>
               <a:ext uri="{FF2B5EF4-FFF2-40B4-BE49-F238E27FC236}">
@@ -9926,7 +10459,7 @@
           <a:p>
             <a:r>
               <a:rPr lang="en-US" sz="2000" dirty="0"/>
-              <a:t>Setup CI/CD.</a:t>
+              <a:t>Add docker to CI pipeline</a:t>
             </a:r>
           </a:p>
           <a:p>
@@ -9956,7 +10489,7 @@
 </p:sld>
 </file>
 
-<file path=ppt/slides/slide8.xml><?xml version="1.0" encoding="utf-8"?>
+<file path=ppt/slides/slide9.xml><?xml version="1.0" encoding="utf-8"?>
 <p:sld xmlns:a="http://schemas.openxmlformats.org/drawingml/2006/main" xmlns:r="http://schemas.openxmlformats.org/officeDocument/2006/relationships" xmlns:p="http://schemas.openxmlformats.org/presentationml/2006/main">
   <p:cSld>
     <p:bg>

</xml_diff>